<commit_message>
ping sensor has been tested and example code has been fixed and updated
</commit_message>
<xml_diff>
--- a/RASPBERRY PI day - 4/JHD162A lcd and sensors interfacing.pptx
+++ b/RASPBERRY PI day - 4/JHD162A lcd and sensors interfacing.pptx
@@ -270,7 +270,7 @@
           <a:p>
             <a:fld id="{2EE00ABF-F2F8-48E3-9108-31B80859F016}" type="datetimeFigureOut">
               <a:rPr lang="en-US" smtClean="0"/>
-              <a:t>8/8/2018</a:t>
+              <a:t>8/13/2018</a:t>
             </a:fld>
             <a:endParaRPr lang="en-US"/>
           </a:p>
@@ -468,7 +468,7 @@
           <a:p>
             <a:fld id="{2EE00ABF-F2F8-48E3-9108-31B80859F016}" type="datetimeFigureOut">
               <a:rPr lang="en-US" smtClean="0"/>
-              <a:t>8/8/2018</a:t>
+              <a:t>8/13/2018</a:t>
             </a:fld>
             <a:endParaRPr lang="en-US"/>
           </a:p>
@@ -676,7 +676,7 @@
           <a:p>
             <a:fld id="{2EE00ABF-F2F8-48E3-9108-31B80859F016}" type="datetimeFigureOut">
               <a:rPr lang="en-US" smtClean="0"/>
-              <a:t>8/8/2018</a:t>
+              <a:t>8/13/2018</a:t>
             </a:fld>
             <a:endParaRPr lang="en-US"/>
           </a:p>
@@ -874,7 +874,7 @@
           <a:p>
             <a:fld id="{2EE00ABF-F2F8-48E3-9108-31B80859F016}" type="datetimeFigureOut">
               <a:rPr lang="en-US" smtClean="0"/>
-              <a:t>8/8/2018</a:t>
+              <a:t>8/13/2018</a:t>
             </a:fld>
             <a:endParaRPr lang="en-US"/>
           </a:p>
@@ -1149,7 +1149,7 @@
           <a:p>
             <a:fld id="{2EE00ABF-F2F8-48E3-9108-31B80859F016}" type="datetimeFigureOut">
               <a:rPr lang="en-US" smtClean="0"/>
-              <a:t>8/8/2018</a:t>
+              <a:t>8/13/2018</a:t>
             </a:fld>
             <a:endParaRPr lang="en-US"/>
           </a:p>
@@ -1414,7 +1414,7 @@
           <a:p>
             <a:fld id="{2EE00ABF-F2F8-48E3-9108-31B80859F016}" type="datetimeFigureOut">
               <a:rPr lang="en-US" smtClean="0"/>
-              <a:t>8/8/2018</a:t>
+              <a:t>8/13/2018</a:t>
             </a:fld>
             <a:endParaRPr lang="en-US"/>
           </a:p>
@@ -1826,7 +1826,7 @@
           <a:p>
             <a:fld id="{2EE00ABF-F2F8-48E3-9108-31B80859F016}" type="datetimeFigureOut">
               <a:rPr lang="en-US" smtClean="0"/>
-              <a:t>8/8/2018</a:t>
+              <a:t>8/13/2018</a:t>
             </a:fld>
             <a:endParaRPr lang="en-US"/>
           </a:p>
@@ -1967,7 +1967,7 @@
           <a:p>
             <a:fld id="{2EE00ABF-F2F8-48E3-9108-31B80859F016}" type="datetimeFigureOut">
               <a:rPr lang="en-US" smtClean="0"/>
-              <a:t>8/8/2018</a:t>
+              <a:t>8/13/2018</a:t>
             </a:fld>
             <a:endParaRPr lang="en-US"/>
           </a:p>
@@ -2080,7 +2080,7 @@
           <a:p>
             <a:fld id="{2EE00ABF-F2F8-48E3-9108-31B80859F016}" type="datetimeFigureOut">
               <a:rPr lang="en-US" smtClean="0"/>
-              <a:t>8/8/2018</a:t>
+              <a:t>8/13/2018</a:t>
             </a:fld>
             <a:endParaRPr lang="en-US"/>
           </a:p>
@@ -2391,7 +2391,7 @@
           <a:p>
             <a:fld id="{2EE00ABF-F2F8-48E3-9108-31B80859F016}" type="datetimeFigureOut">
               <a:rPr lang="en-US" smtClean="0"/>
-              <a:t>8/8/2018</a:t>
+              <a:t>8/13/2018</a:t>
             </a:fld>
             <a:endParaRPr lang="en-US"/>
           </a:p>
@@ -2679,7 +2679,7 @@
           <a:p>
             <a:fld id="{2EE00ABF-F2F8-48E3-9108-31B80859F016}" type="datetimeFigureOut">
               <a:rPr lang="en-US" smtClean="0"/>
-              <a:t>8/8/2018</a:t>
+              <a:t>8/13/2018</a:t>
             </a:fld>
             <a:endParaRPr lang="en-US"/>
           </a:p>
@@ -2920,7 +2920,7 @@
           <a:p>
             <a:fld id="{2EE00ABF-F2F8-48E3-9108-31B80859F016}" type="datetimeFigureOut">
               <a:rPr lang="en-US" smtClean="0"/>
-              <a:t>8/8/2018</a:t>
+              <a:t>8/13/2018</a:t>
             </a:fld>
             <a:endParaRPr lang="en-US"/>
           </a:p>
@@ -6492,7 +6492,7 @@
         <p:spPr>
           <a:xfrm>
             <a:off x="898872" y="905682"/>
-            <a:ext cx="5003800" cy="5755422"/>
+            <a:ext cx="5003800" cy="5632311"/>
           </a:xfrm>
           <a:prstGeom prst="rect">
             <a:avLst/>
@@ -6506,187 +6506,167 @@
           <a:lstStyle/>
           <a:p>
             <a:r>
-              <a:rPr lang="pt-BR" sz="2000" dirty="0"/>
+              <a:rPr lang="pt-BR" dirty="0"/>
               <a:t>import RPi.GPIO as gpio</a:t>
             </a:r>
           </a:p>
           <a:p>
             <a:r>
-              <a:rPr lang="en-US" sz="2000" dirty="0"/>
+              <a:rPr lang="en-US" dirty="0"/>
               <a:t>import time</a:t>
             </a:r>
           </a:p>
           <a:p>
-            <a:endParaRPr lang="en-US" sz="2000" dirty="0"/>
-          </a:p>
-          <a:p>
-            <a:r>
-              <a:rPr lang="en-US" sz="2000" dirty="0"/>
+            <a:endParaRPr lang="en-US" dirty="0"/>
+          </a:p>
+          <a:p>
+            <a:r>
+              <a:rPr lang="en-US" dirty="0"/>
               <a:t>TRIG = 26</a:t>
             </a:r>
           </a:p>
           <a:p>
             <a:r>
-              <a:rPr lang="en-US" sz="2000" dirty="0"/>
-              <a:t>ECO = 19</a:t>
-            </a:r>
-          </a:p>
-          <a:p>
-            <a:endParaRPr lang="en-US" sz="2000" dirty="0"/>
-          </a:p>
-          <a:p>
-            <a:r>
-              <a:rPr lang="en-US" sz="2000" dirty="0" err="1"/>
+              <a:rPr lang="en-US" dirty="0"/>
+              <a:t>ECO  = 19</a:t>
+            </a:r>
+          </a:p>
+          <a:p>
+            <a:endParaRPr lang="en-US" dirty="0"/>
+          </a:p>
+          <a:p>
+            <a:r>
+              <a:rPr lang="en-US" dirty="0" err="1"/>
+              <a:t>gpio.setwarnings</a:t>
+            </a:r>
+            <a:r>
+              <a:rPr lang="en-US" dirty="0"/>
+              <a:t>(False)</a:t>
+            </a:r>
+          </a:p>
+          <a:p>
+            <a:r>
+              <a:rPr lang="en-US" dirty="0" err="1"/>
+              <a:t>gpio.cleanup</a:t>
+            </a:r>
+            <a:r>
+              <a:rPr lang="en-US" dirty="0"/>
+              <a:t>()</a:t>
+            </a:r>
+          </a:p>
+          <a:p>
+            <a:endParaRPr lang="en-US" dirty="0"/>
+          </a:p>
+          <a:p>
+            <a:r>
+              <a:rPr lang="en-US" dirty="0" err="1"/>
               <a:t>gpio.setmode</a:t>
             </a:r>
             <a:r>
-              <a:rPr lang="en-US" sz="2000" dirty="0"/>
+              <a:rPr lang="en-US" dirty="0"/>
               <a:t>(</a:t>
             </a:r>
             <a:r>
-              <a:rPr lang="en-US" sz="2000" dirty="0" err="1"/>
+              <a:rPr lang="en-US" dirty="0" err="1"/>
               <a:t>gpio.BCM</a:t>
             </a:r>
             <a:r>
-              <a:rPr lang="en-US" sz="2000" dirty="0"/>
+              <a:rPr lang="en-US" dirty="0"/>
               <a:t>)</a:t>
             </a:r>
           </a:p>
           <a:p>
             <a:r>
-              <a:rPr lang="en-US" sz="2000" dirty="0" err="1"/>
+              <a:rPr lang="en-US" dirty="0" err="1"/>
               <a:t>gpio.setup</a:t>
             </a:r>
             <a:r>
-              <a:rPr lang="en-US" sz="2000" dirty="0"/>
+              <a:rPr lang="en-US" dirty="0"/>
               <a:t>(TRIG, </a:t>
             </a:r>
             <a:r>
-              <a:rPr lang="en-US" sz="2000" dirty="0" err="1"/>
+              <a:rPr lang="en-US" dirty="0" err="1"/>
               <a:t>gpio.OUT</a:t>
             </a:r>
             <a:r>
-              <a:rPr lang="en-US" sz="2000" dirty="0"/>
+              <a:rPr lang="en-US" dirty="0"/>
               <a:t>)</a:t>
             </a:r>
           </a:p>
           <a:p>
-            <a:pPr>
-              <a:lnSpc>
-                <a:spcPct val="60000"/>
-              </a:lnSpc>
-            </a:pPr>
-            <a:r>
-              <a:rPr lang="en-US" sz="2000" dirty="0" err="1"/>
+            <a:r>
+              <a:rPr lang="en-US" dirty="0" err="1"/>
               <a:t>gpio.setup</a:t>
             </a:r>
             <a:r>
-              <a:rPr lang="en-US" sz="2000" dirty="0"/>
+              <a:rPr lang="en-US" dirty="0"/>
               <a:t>(ECO, gpio.IN)</a:t>
             </a:r>
           </a:p>
           <a:p>
-            <a:pPr>
-              <a:lnSpc>
-                <a:spcPct val="60000"/>
-              </a:lnSpc>
-            </a:pPr>
-            <a:endParaRPr lang="en-US" sz="2000" dirty="0"/>
-          </a:p>
-          <a:p>
-            <a:pPr>
-              <a:lnSpc>
-                <a:spcPct val="60000"/>
-              </a:lnSpc>
-            </a:pPr>
-            <a:r>
-              <a:rPr lang="en-US" sz="2000" dirty="0" err="1"/>
-              <a:t>gpio.setwarning</a:t>
-            </a:r>
-            <a:r>
-              <a:rPr lang="en-US" sz="2000" dirty="0"/>
-              <a:t>(False)</a:t>
-            </a:r>
-          </a:p>
-          <a:p>
-            <a:pPr>
-              <a:lnSpc>
-                <a:spcPct val="60000"/>
-              </a:lnSpc>
-            </a:pPr>
-            <a:r>
-              <a:rPr lang="en-US" sz="2000" dirty="0" err="1"/>
-              <a:t>gpio.cleanup</a:t>
-            </a:r>
-            <a:r>
-              <a:rPr lang="en-US" sz="2000" dirty="0"/>
-              <a:t>()</a:t>
-            </a:r>
-          </a:p>
-          <a:p>
-            <a:endParaRPr lang="en-US" sz="2000" dirty="0"/>
-          </a:p>
-          <a:p>
-            <a:endParaRPr lang="en-US" sz="2000" dirty="0"/>
-          </a:p>
-          <a:p>
-            <a:r>
-              <a:rPr lang="en-US" sz="2000" dirty="0" err="1"/>
+            <a:endParaRPr lang="en-US" dirty="0"/>
+          </a:p>
+          <a:p>
+            <a:endParaRPr lang="en-US" dirty="0"/>
+          </a:p>
+          <a:p>
+            <a:r>
+              <a:rPr lang="en-US" dirty="0" err="1"/>
               <a:t>gpio.output</a:t>
             </a:r>
             <a:r>
-              <a:rPr lang="en-US" sz="2000" dirty="0"/>
+              <a:rPr lang="en-US" dirty="0"/>
+              <a:t>(TRIG, True)</a:t>
+            </a:r>
+          </a:p>
+          <a:p>
+            <a:r>
+              <a:rPr lang="en-US" dirty="0" err="1"/>
+              <a:t>time.sleep</a:t>
+            </a:r>
+            <a:r>
+              <a:rPr lang="en-US" dirty="0"/>
+              <a:t>(0.0001)</a:t>
+            </a:r>
+          </a:p>
+          <a:p>
+            <a:r>
+              <a:rPr lang="en-US" dirty="0" err="1"/>
+              <a:t>gpio.output</a:t>
+            </a:r>
+            <a:r>
+              <a:rPr lang="en-US" dirty="0"/>
               <a:t>(TRIG, False)</a:t>
             </a:r>
           </a:p>
           <a:p>
-            <a:r>
-              <a:rPr lang="en-US" sz="2000" dirty="0" err="1"/>
-              <a:t>time.sleep</a:t>
-            </a:r>
-            <a:r>
-              <a:rPr lang="en-US" sz="2000" dirty="0"/>
-              <a:t>(0.0001)</a:t>
-            </a:r>
-          </a:p>
-          <a:p>
-            <a:r>
-              <a:rPr lang="en-US" sz="2000" dirty="0" err="1"/>
-              <a:t>gpio.output</a:t>
-            </a:r>
-            <a:r>
-              <a:rPr lang="en-US" sz="2000" dirty="0"/>
-              <a:t>(TRIG, True)</a:t>
-            </a:r>
-          </a:p>
-          <a:p>
-            <a:endParaRPr lang="en-US" sz="2000" dirty="0"/>
-          </a:p>
-          <a:p>
-            <a:r>
-              <a:rPr lang="en-US" sz="2000" dirty="0"/>
+            <a:endParaRPr lang="en-US" dirty="0"/>
+          </a:p>
+          <a:p>
+            <a:r>
+              <a:rPr lang="en-US" dirty="0"/>
               <a:t>while </a:t>
             </a:r>
             <a:r>
-              <a:rPr lang="en-US" sz="2000" dirty="0" err="1"/>
+              <a:rPr lang="en-US" dirty="0" err="1"/>
               <a:t>gpio.input</a:t>
             </a:r>
             <a:r>
-              <a:rPr lang="en-US" sz="2000" dirty="0"/>
+              <a:rPr lang="en-US" dirty="0"/>
               <a:t>(ECO) == False:</a:t>
             </a:r>
           </a:p>
           <a:p>
             <a:r>
-              <a:rPr lang="en-US" sz="2000" dirty="0"/>
+              <a:rPr lang="en-US" dirty="0"/>
               <a:t>        start = </a:t>
             </a:r>
             <a:r>
-              <a:rPr lang="en-US" sz="2000" dirty="0" err="1"/>
+              <a:rPr lang="en-US" dirty="0" err="1"/>
               <a:t>time.time</a:t>
             </a:r>
             <a:r>
-              <a:rPr lang="en-US" sz="2000" dirty="0"/>
+              <a:rPr lang="en-US" dirty="0"/>
               <a:t>()</a:t>
             </a:r>
           </a:p>
@@ -6707,7 +6687,7 @@
         <p:spPr>
           <a:xfrm>
             <a:off x="6096000" y="1073289"/>
-            <a:ext cx="5758179" cy="4955203"/>
+            <a:ext cx="5758179" cy="5262979"/>
           </a:xfrm>
           <a:prstGeom prst="rect">
             <a:avLst/>
@@ -6723,6 +6703,9 @@
             <a:endParaRPr lang="en-US" dirty="0"/>
           </a:p>
           <a:p>
+            <a:endParaRPr lang="en-US" sz="2000" dirty="0"/>
+          </a:p>
+          <a:p>
             <a:r>
               <a:rPr lang="en-US" sz="2000" dirty="0"/>
               <a:t>while </a:t>
@@ -6760,7 +6743,7 @@
             </a:r>
             <a:r>
               <a:rPr lang="en-US" sz="2000" dirty="0"/>
-              <a:t> = end – start</a:t>
+              <a:t> = end-start</a:t>
             </a:r>
           </a:p>
           <a:p>
@@ -6774,12 +6757,8 @@
           </a:p>
           <a:p>
             <a:r>
-              <a:rPr lang="en-US" sz="2000" dirty="0" err="1"/>
-              <a:t>distace</a:t>
-            </a:r>
-            <a:r>
               <a:rPr lang="en-US" sz="2000" dirty="0"/>
-              <a:t> = </a:t>
+              <a:t>distance = </a:t>
             </a:r>
             <a:r>
               <a:rPr lang="en-US" sz="2000" dirty="0" err="1"/>

</xml_diff>